<commit_message>
The final version is commited
</commit_message>
<xml_diff>
--- a/eda_Zahra_Mahmoodabadi.pptx
+++ b/eda_Zahra_Mahmoodabadi.pptx
@@ -17263,8 +17263,18 @@
           <a:p>
             <a:r>
               <a:rPr lang="en-US" dirty="0"/>
-              <a:t>Chinook Data Analysis</a:t>
+              <a:t>Chinook </a:t>
             </a:r>
+            <a:br>
+              <a:rPr lang="en-US" dirty="0"/>
+            </a:br>
+            <a:r>
+              <a:rPr lang="en-US"/>
+              <a:t>Data Analysis</a:t>
+            </a:r>
+            <a:br>
+              <a:rPr lang="en-US"/>
+            </a:br>
             <a:br>
               <a:rPr lang="en-US" dirty="0"/>
             </a:br>
@@ -19145,48 +19155,80 @@
           </a:bodyPr>
           <a:lstStyle/>
           <a:p>
+            <a:pPr marL="342900" indent="-342900">
+              <a:buFont typeface="Arial" panose="020B0604020202020204" pitchFamily="34" charset="0"/>
+              <a:buChar char="•"/>
+            </a:pPr>
             <a:r>
               <a:rPr lang="en-US" dirty="0"/>
               <a:t>Introduction</a:t>
             </a:r>
           </a:p>
           <a:p>
+            <a:pPr marL="342900" indent="-342900">
+              <a:buFont typeface="Arial" panose="020B0604020202020204" pitchFamily="34" charset="0"/>
+              <a:buChar char="•"/>
+            </a:pPr>
             <a:r>
               <a:rPr lang="en-US" dirty="0"/>
               <a:t>An Initial study on chinook data</a:t>
             </a:r>
           </a:p>
           <a:p>
+            <a:pPr marL="342900" indent="-342900">
+              <a:buFont typeface="Arial" panose="020B0604020202020204" pitchFamily="34" charset="0"/>
+              <a:buChar char="•"/>
+            </a:pPr>
             <a:r>
               <a:rPr lang="en-US" dirty="0"/>
               <a:t>Key variables plot</a:t>
             </a:r>
           </a:p>
           <a:p>
+            <a:pPr marL="342900" indent="-342900">
+              <a:buFont typeface="Arial" panose="020B0604020202020204" pitchFamily="34" charset="0"/>
+              <a:buChar char="•"/>
+            </a:pPr>
             <a:r>
               <a:rPr lang="en-US" dirty="0"/>
               <a:t>Normal variables in data</a:t>
             </a:r>
           </a:p>
           <a:p>
+            <a:pPr marL="342900" indent="-342900">
+              <a:buFont typeface="Arial" panose="020B0604020202020204" pitchFamily="34" charset="0"/>
+              <a:buChar char="•"/>
+            </a:pPr>
             <a:r>
               <a:rPr lang="en-US" dirty="0"/>
               <a:t>Remove outliers data</a:t>
             </a:r>
           </a:p>
           <a:p>
+            <a:pPr marL="342900" indent="-342900">
+              <a:buFont typeface="Arial" panose="020B0604020202020204" pitchFamily="34" charset="0"/>
+              <a:buChar char="•"/>
+            </a:pPr>
             <a:r>
               <a:rPr lang="en-US" dirty="0"/>
               <a:t>Hypothesis tests</a:t>
             </a:r>
           </a:p>
           <a:p>
+            <a:pPr marL="342900" indent="-342900">
+              <a:buFont typeface="Arial" panose="020B0604020202020204" pitchFamily="34" charset="0"/>
+              <a:buChar char="•"/>
+            </a:pPr>
             <a:r>
               <a:rPr lang="en-US" dirty="0"/>
-              <a:t>confidence interval</a:t>
+              <a:t>Confidence interval</a:t>
             </a:r>
           </a:p>
           <a:p>
+            <a:pPr marL="342900" indent="-342900">
+              <a:buFont typeface="Arial" panose="020B0604020202020204" pitchFamily="34" charset="0"/>
+              <a:buChar char="•"/>
+            </a:pPr>
             <a:endParaRPr lang="en-US" dirty="0"/>
           </a:p>
         </p:txBody>
@@ -20162,7 +20204,9 @@
           </a:xfrm>
         </p:spPr>
         <p:txBody>
-          <a:bodyPr/>
+          <a:bodyPr>
+            <a:normAutofit fontScale="70000" lnSpcReduction="20000"/>
+          </a:bodyPr>
           <a:lstStyle/>
           <a:p>
             <a:pPr marL="285750" indent="-285750">
@@ -20172,6 +20216,20 @@
             <a:r>
               <a:rPr lang="en-US" dirty="0"/>
               <a:t>Is the average length of songs the same across different genres?</a:t>
+            </a:r>
+          </a:p>
+          <a:p>
+            <a:pPr marL="569214" lvl="1" indent="-285750"/>
+            <a:r>
+              <a:rPr lang="en-US" dirty="0"/>
+              <a:t>Hip Hop/Rap: (152.53489172764037, 203.81767970093105) seconds</a:t>
+            </a:r>
+          </a:p>
+          <a:p>
+            <a:pPr marL="569214" lvl="1" indent="-285750"/>
+            <a:r>
+              <a:rPr lang="en-US" dirty="0"/>
+              <a:t>Jazz: (269.55851534194574, 313.95223850420814) seconds</a:t>
             </a:r>
           </a:p>
           <a:p>
@@ -22342,6 +22400,26 @@
 </file>
 
 <file path=customXml/item1.xml><?xml version="1.0" encoding="utf-8"?>
+<p:properties xmlns:p="http://schemas.microsoft.com/office/2006/metadata/properties" xmlns:xsi="http://www.w3.org/2001/XMLSchema-instance" xmlns:pc="http://schemas.microsoft.com/office/infopath/2007/PartnerControls">
+  <documentManagement>
+    <_ip_UnifiedCompliancePolicyUIAction xmlns="http://schemas.microsoft.com/sharepoint/v3" xsi:nil="true"/>
+    <Image xmlns="71af3243-3dd4-4a8d-8c0d-dd76da1f02a5">
+      <Url xsi:nil="true"/>
+      <Description xsi:nil="true"/>
+    </Image>
+    <Status xmlns="71af3243-3dd4-4a8d-8c0d-dd76da1f02a5">Not started</Status>
+    <Background xmlns="71af3243-3dd4-4a8d-8c0d-dd76da1f02a5">false</Background>
+    <_ip_UnifiedCompliancePolicyProperties xmlns="http://schemas.microsoft.com/sharepoint/v3" xsi:nil="true"/>
+    <ImageTagsTaxHTField xmlns="71af3243-3dd4-4a8d-8c0d-dd76da1f02a5">
+      <Terms xmlns="http://schemas.microsoft.com/office/infopath/2007/PartnerControls"/>
+    </ImageTagsTaxHTField>
+    <TaxCatchAll xmlns="230e9df3-be65-4c73-a93b-d1236ebd677e" xsi:nil="true"/>
+    <MediaServiceKeyPoints xmlns="71af3243-3dd4-4a8d-8c0d-dd76da1f02a5" xsi:nil="true"/>
+  </documentManagement>
+</p:properties>
+</file>
+
+<file path=customXml/item2.xml><?xml version="1.0" encoding="utf-8"?>
 <ct:contentTypeSchema xmlns:ct="http://schemas.microsoft.com/office/2006/metadata/contentType" xmlns:ma="http://schemas.microsoft.com/office/2006/metadata/properties/metaAttributes" ct:_="" ma:_="" ma:contentTypeName="Document" ma:contentTypeID="0x01010079F111ED35F8CC479449609E8A0923A6" ma:contentTypeVersion="28" ma:contentTypeDescription="Create a new document." ma:contentTypeScope="" ma:versionID="60f5a4f2d2b0abadcf532d48ebf9cb71">
   <xsd:schema xmlns:xsd="http://www.w3.org/2001/XMLSchema" xmlns:xs="http://www.w3.org/2001/XMLSchema" xmlns:p="http://schemas.microsoft.com/office/2006/metadata/properties" xmlns:ns1="http://schemas.microsoft.com/sharepoint/v3" xmlns:ns2="71af3243-3dd4-4a8d-8c0d-dd76da1f02a5" xmlns:ns3="16c05727-aa75-4e4a-9b5f-8a80a1165891" xmlns:ns4="230e9df3-be65-4c73-a93b-d1236ebd677e" targetNamespace="http://schemas.microsoft.com/office/2006/metadata/properties" ma:root="true" ma:fieldsID="7dd78129e6a1811f84807ad11c651531" ns1:_="" ns2:_="" ns3:_="" ns4:_="">
     <xsd:import namespace="http://schemas.microsoft.com/sharepoint/v3"/>
@@ -22653,26 +22731,6 @@
 </ct:contentTypeSchema>
 </file>
 
-<file path=customXml/item2.xml><?xml version="1.0" encoding="utf-8"?>
-<p:properties xmlns:p="http://schemas.microsoft.com/office/2006/metadata/properties" xmlns:xsi="http://www.w3.org/2001/XMLSchema-instance" xmlns:pc="http://schemas.microsoft.com/office/infopath/2007/PartnerControls">
-  <documentManagement>
-    <_ip_UnifiedCompliancePolicyUIAction xmlns="http://schemas.microsoft.com/sharepoint/v3" xsi:nil="true"/>
-    <Image xmlns="71af3243-3dd4-4a8d-8c0d-dd76da1f02a5">
-      <Url xsi:nil="true"/>
-      <Description xsi:nil="true"/>
-    </Image>
-    <Status xmlns="71af3243-3dd4-4a8d-8c0d-dd76da1f02a5">Not started</Status>
-    <Background xmlns="71af3243-3dd4-4a8d-8c0d-dd76da1f02a5">false</Background>
-    <_ip_UnifiedCompliancePolicyProperties xmlns="http://schemas.microsoft.com/sharepoint/v3" xsi:nil="true"/>
-    <ImageTagsTaxHTField xmlns="71af3243-3dd4-4a8d-8c0d-dd76da1f02a5">
-      <Terms xmlns="http://schemas.microsoft.com/office/infopath/2007/PartnerControls"/>
-    </ImageTagsTaxHTField>
-    <TaxCatchAll xmlns="230e9df3-be65-4c73-a93b-d1236ebd677e" xsi:nil="true"/>
-    <MediaServiceKeyPoints xmlns="71af3243-3dd4-4a8d-8c0d-dd76da1f02a5" xsi:nil="true"/>
-  </documentManagement>
-</p:properties>
-</file>
-
 <file path=customXml/item3.xml><?xml version="1.0" encoding="utf-8"?>
 <?mso-contentType ?>
 <FormTemplates xmlns="http://schemas.microsoft.com/sharepoint/v3/contenttype/forms">
@@ -22683,6 +22741,18 @@
 </file>
 
 <file path=customXml/itemProps1.xml><?xml version="1.0" encoding="utf-8"?>
+<ds:datastoreItem xmlns:ds="http://schemas.openxmlformats.org/officeDocument/2006/customXml" ds:itemID="{BA719FA4-954C-4FA8-82CB-206659C3B826}">
+  <ds:schemaRefs>
+    <ds:schemaRef ds:uri="http://schemas.microsoft.com/office/2006/metadata/properties"/>
+    <ds:schemaRef ds:uri="http://schemas.microsoft.com/office/infopath/2007/PartnerControls"/>
+    <ds:schemaRef ds:uri="http://schemas.microsoft.com/sharepoint/v3"/>
+    <ds:schemaRef ds:uri="71af3243-3dd4-4a8d-8c0d-dd76da1f02a5"/>
+    <ds:schemaRef ds:uri="230e9df3-be65-4c73-a93b-d1236ebd677e"/>
+  </ds:schemaRefs>
+</ds:datastoreItem>
+</file>
+
+<file path=customXml/itemProps2.xml><?xml version="1.0" encoding="utf-8"?>
 <ds:datastoreItem xmlns:ds="http://schemas.openxmlformats.org/officeDocument/2006/customXml" ds:itemID="{04948363-B267-4BAC-8655-100FBEC280C1}">
   <ds:schemaRefs>
     <ds:schemaRef ds:uri="http://schemas.microsoft.com/office/2006/metadata/contentType"/>
@@ -22703,18 +22773,6 @@
 </ds:datastoreItem>
 </file>
 
-<file path=customXml/itemProps2.xml><?xml version="1.0" encoding="utf-8"?>
-<ds:datastoreItem xmlns:ds="http://schemas.openxmlformats.org/officeDocument/2006/customXml" ds:itemID="{BA719FA4-954C-4FA8-82CB-206659C3B826}">
-  <ds:schemaRefs>
-    <ds:schemaRef ds:uri="http://schemas.microsoft.com/office/2006/metadata/properties"/>
-    <ds:schemaRef ds:uri="http://schemas.microsoft.com/office/infopath/2007/PartnerControls"/>
-    <ds:schemaRef ds:uri="http://schemas.microsoft.com/sharepoint/v3"/>
-    <ds:schemaRef ds:uri="71af3243-3dd4-4a8d-8c0d-dd76da1f02a5"/>
-    <ds:schemaRef ds:uri="230e9df3-be65-4c73-a93b-d1236ebd677e"/>
-  </ds:schemaRefs>
-</ds:datastoreItem>
-</file>
-
 <file path=customXml/itemProps3.xml><?xml version="1.0" encoding="utf-8"?>
 <ds:datastoreItem xmlns:ds="http://schemas.openxmlformats.org/officeDocument/2006/customXml" ds:itemID="{16DBB56F-4362-4386-A1A1-3DF898896616}">
   <ds:schemaRefs>

</xml_diff>